<commit_message>
Added links to more info about text columns and positioning
</commit_message>
<xml_diff>
--- a/murach_html_4e/slides/Chapter 6 slides (Revised).pptx
+++ b/murach_html_4e/slides/Chapter 6 slides (Revised).pptx
@@ -365,7 +365,7 @@
               <a:pPr>
                 <a:defRPr/>
               </a:pPr>
-              <a:t>6/11/2019</a:t>
+              <a:t>6/12/2019</a:t>
             </a:fld>
             <a:endParaRPr lang="en-US"/>
           </a:p>
@@ -11662,6 +11662,73 @@
           </a:p>
         </p:txBody>
       </p:sp>
+      <p:sp>
+        <p:nvSpPr>
+          <p:cNvPr id="3" name="Rectangle 2">
+            <a:extLst>
+              <a:ext uri="{FF2B5EF4-FFF2-40B4-BE49-F238E27FC236}">
+                <a16:creationId xmlns:a16="http://schemas.microsoft.com/office/drawing/2014/main" id="{C5DB8258-E61D-41A2-82CF-B816F1B894FC}"/>
+              </a:ext>
+            </a:extLst>
+          </p:cNvPr>
+          <p:cNvSpPr/>
+          <p:nvPr/>
+        </p:nvSpPr>
+        <p:spPr>
+          <a:xfrm>
+            <a:off x="895865" y="4103382"/>
+            <a:ext cx="4792017" cy="707886"/>
+          </a:xfrm>
+          <a:prstGeom prst="rect">
+            <a:avLst/>
+          </a:prstGeom>
+        </p:spPr>
+        <p:txBody>
+          <a:bodyPr wrap="square">
+            <a:spAutoFit/>
+          </a:bodyPr>
+          <a:lstStyle/>
+          <a:p>
+            <a:pPr marL="347663"/>
+            <a:r>
+              <a:rPr lang="en-US" sz="2000" b="1" dirty="0">
+                <a:solidFill>
+                  <a:srgbClr val="000099"/>
+                </a:solidFill>
+                <a:latin typeface="+mn-lt"/>
+                <a:cs typeface="Times New Roman" panose="02020603050405020304" pitchFamily="18" charset="0"/>
+              </a:rPr>
+              <a:t>Try it out</a:t>
+            </a:r>
+          </a:p>
+          <a:p>
+            <a:pPr marL="347663"/>
+            <a:r>
+              <a:rPr lang="en-US" sz="2000" dirty="0">
+                <a:solidFill>
+                  <a:srgbClr val="0070C0"/>
+                </a:solidFill>
+                <a:latin typeface="+mn-lt"/>
+                <a:hlinkClick r:id="rId3">
+                  <a:extLst>
+                    <a:ext uri="{A12FA001-AC4F-418D-AE19-62706E023703}">
+                      <ahyp:hlinkClr xmlns:ahyp="http://schemas.microsoft.com/office/drawing/2018/hyperlinkcolor" val="tx"/>
+                    </a:ext>
+                  </a:extLst>
+                </a:hlinkClick>
+              </a:rPr>
+              <a:t>http://aaronlumsden.com/multicol/</a:t>
+            </a:r>
+            <a:endParaRPr lang="en-US" sz="2000" b="1" dirty="0">
+              <a:solidFill>
+                <a:srgbClr val="0070C0"/>
+              </a:solidFill>
+              <a:latin typeface="+mn-lt"/>
+              <a:cs typeface="Times New Roman" panose="02020603050405020304" pitchFamily="18" charset="0"/>
+            </a:endParaRPr>
+          </a:p>
+        </p:txBody>
+      </p:sp>
     </p:spTree>
     <p:extLst>
       <p:ext uri="{BB962C8B-B14F-4D97-AF65-F5344CB8AC3E}">
@@ -12461,7 +12528,60 @@
               </a:rPr>
               <a:t>relative</a:t>
             </a:r>
-            <a:endParaRPr lang="en-US" sz="1600" dirty="0"/>
+          </a:p>
+          <a:p>
+            <a:pPr marL="347663"/>
+            <a:r>
+              <a:rPr lang="en-US" sz="1600" b="1" dirty="0">
+                <a:latin typeface="Courier New" panose="02070309020205020404" pitchFamily="49" charset="0"/>
+                <a:ea typeface="Times New Roman" panose="02020603050405020304" pitchFamily="18" charset="0"/>
+              </a:rPr>
+              <a:t>sticky</a:t>
+            </a:r>
+          </a:p>
+          <a:p>
+            <a:pPr marL="347663"/>
+            <a:endParaRPr lang="en-US" sz="1600" b="1" dirty="0">
+              <a:latin typeface="Courier New" panose="02070309020205020404" pitchFamily="49" charset="0"/>
+            </a:endParaRPr>
+          </a:p>
+          <a:p>
+            <a:pPr marL="347663"/>
+            <a:r>
+              <a:rPr lang="en-US" sz="2400" b="1" dirty="0">
+                <a:solidFill>
+                  <a:srgbClr val="000099"/>
+                </a:solidFill>
+                <a:latin typeface="Arial" panose="020B0604020202020204" pitchFamily="34" charset="0"/>
+                <a:cs typeface="Times New Roman" panose="02020603050405020304" pitchFamily="18" charset="0"/>
+              </a:rPr>
+              <a:t>More Information</a:t>
+            </a:r>
+          </a:p>
+          <a:p>
+            <a:pPr marL="347663"/>
+            <a:r>
+              <a:rPr lang="en-US" sz="1600" dirty="0">
+                <a:solidFill>
+                  <a:srgbClr val="0070C0"/>
+                </a:solidFill>
+                <a:hlinkClick r:id="rId2">
+                  <a:extLst>
+                    <a:ext uri="{A12FA001-AC4F-418D-AE19-62706E023703}">
+                      <ahyp:hlinkClr xmlns:ahyp="http://schemas.microsoft.com/office/drawing/2018/hyperlinkcolor" val="tx"/>
+                    </a:ext>
+                  </a:extLst>
+                </a:hlinkClick>
+              </a:rPr>
+              <a:t>https://www.w3schools.com/css/css_positioning.asp</a:t>
+            </a:r>
+            <a:endParaRPr lang="en-US" sz="1600" b="1" dirty="0">
+              <a:solidFill>
+                <a:srgbClr val="0070C0"/>
+              </a:solidFill>
+              <a:latin typeface="Courier New" panose="02070309020205020404" pitchFamily="49" charset="0"/>
+              <a:ea typeface="Times New Roman" panose="02020603050405020304" pitchFamily="18" charset="0"/>
+            </a:endParaRPr>
           </a:p>
         </p:txBody>
       </p:sp>

</xml_diff>

<commit_message>
Updating slide with popular resolution from yester-year.
</commit_message>
<xml_diff>
--- a/murach_html_4e/slides/Chapter 6 slides (Revised).pptx
+++ b/murach_html_4e/slides/Chapter 6 slides (Revised).pptx
@@ -15981,6 +15981,20 @@
             <a:r>
               <a:rPr lang="en-US" sz="2000"/>
               <a:t>Maximum target resolution was </a:t>
+            </a:r>
+            <a:r>
+              <a:rPr lang="en-US" sz="2000" b="1"/>
+              <a:t>1280x1024</a:t>
+            </a:r>
+          </a:p>
+          <a:p>
+            <a:pPr marL="800100" lvl="1" indent="-342900">
+              <a:buFont typeface="Arial" panose="020B0604020202020204" pitchFamily="34" charset="0"/>
+              <a:buChar char="•"/>
+            </a:pPr>
+            <a:r>
+              <a:rPr lang="en-US" sz="2000"/>
+              <a:t>The most popular resolution was </a:t>
             </a:r>
             <a:r>
               <a:rPr lang="en-US" sz="2000" b="1"/>

</xml_diff>